<commit_message>
got pyinstaller to work with nice file size; don't use seaborn or pandas or matplotlib to reduce pyinstaller file size; put back the rayflare_text_base_server for testing;
</commit_message>
<xml_diff>
--- a/2026-01-21 pyinstaller.pptx
+++ b/2026-01-21 pyinstaller.pptx
@@ -104,6 +104,11 @@
       </a:defRPr>
     </a:lvl9pPr>
   </p:defaultTextStyle>
+  <p:extLst>
+    <p:ext uri="{EFAFB233-063F-42B5-8137-9DF3F51BA10A}">
+      <p15:sldGuideLst xmlns:p15="http://schemas.microsoft.com/office/powerpoint/2012/main"/>
+    </p:ext>
+  </p:extLst>
 </p:presentation>
 </file>
 
@@ -3356,8 +3361,8 @@
         </p:nvSpPr>
         <p:spPr>
           <a:xfrm>
-            <a:off x="1227582" y="2830175"/>
-            <a:ext cx="6094476" cy="923330"/>
+            <a:off x="1306240" y="3733800"/>
+            <a:ext cx="6094476" cy="369332"/>
           </a:xfrm>
           <a:prstGeom prst="rect">
             <a:avLst/>
@@ -3371,58 +3376,31 @@
           <a:lstStyle/>
           <a:p>
             <a:r>
+              <a:rPr lang="en-CA" dirty="0"/>
+              <a:t>python -m </a:t>
+            </a:r>
+            <a:r>
               <a:rPr lang="en-CA" dirty="0" err="1"/>
               <a:t>PyInstaller</a:t>
             </a:r>
             <a:r>
-              <a:rPr lang="en-CA"/>
-              <a:t> tcp_</a:t>
-            </a:r>
-            <a:r>
               <a:rPr lang="en-CA" dirty="0"/>
-              <a:t>server.py --</a:t>
+              <a:t> tcp_server.py --</a:t>
             </a:r>
             <a:r>
               <a:rPr lang="en-CA" dirty="0" err="1"/>
-              <a:t>onedir</a:t>
-            </a:r>
-            <a:r>
-              <a:rPr lang="en-CA" dirty="0"/>
-              <a:t> --exclude-module </a:t>
-            </a:r>
-            <a:r>
-              <a:rPr lang="en-CA" dirty="0" err="1"/>
-              <a:t>numba</a:t>
-            </a:r>
-            <a:r>
-              <a:rPr lang="en-CA" dirty="0"/>
-              <a:t> --exclude-module </a:t>
-            </a:r>
-            <a:r>
-              <a:rPr lang="en-CA" dirty="0" err="1"/>
-              <a:t>llvmlite</a:t>
-            </a:r>
-            <a:r>
-              <a:rPr lang="en-CA" dirty="0"/>
-              <a:t> --debug=imports --</a:t>
-            </a:r>
-            <a:r>
-              <a:rPr lang="en-CA" dirty="0" err="1"/>
-              <a:t>noconfirm</a:t>
-            </a:r>
-            <a:r>
-              <a:rPr lang="en-CA" dirty="0"/>
-              <a:t> --clean</a:t>
-            </a:r>
-          </a:p>
-        </p:txBody>
-      </p:sp>
-      <p:sp>
-        <p:nvSpPr>
-          <p:cNvPr id="6" name="TextBox 5">
-            <a:extLst>
-              <a:ext uri="{FF2B5EF4-FFF2-40B4-BE49-F238E27FC236}">
-                <a16:creationId xmlns:a16="http://schemas.microsoft.com/office/drawing/2014/main" id="{D0AE6F7C-7BC9-1F12-53B9-1CF920681692}"/>
+              <a:t>onefile</a:t>
+            </a:r>
+            <a:endParaRPr lang="en-CA" dirty="0"/>
+          </a:p>
+        </p:txBody>
+      </p:sp>
+      <p:sp>
+        <p:nvSpPr>
+          <p:cNvPr id="3" name="TextBox 2">
+            <a:extLst>
+              <a:ext uri="{FF2B5EF4-FFF2-40B4-BE49-F238E27FC236}">
+                <a16:creationId xmlns:a16="http://schemas.microsoft.com/office/drawing/2014/main" id="{28BC077C-8F4B-D6A6-952D-36B543559F22}"/>
               </a:ext>
             </a:extLst>
           </p:cNvPr>
@@ -3431,8 +3409,8 @@
         </p:nvSpPr>
         <p:spPr>
           <a:xfrm>
-            <a:off x="1227582" y="1117199"/>
-            <a:ext cx="6094476" cy="1477328"/>
+            <a:off x="1306240" y="2118852"/>
+            <a:ext cx="6096000" cy="369332"/>
           </a:xfrm>
           <a:prstGeom prst="rect">
             <a:avLst/>
@@ -3447,32 +3425,210 @@
           <a:p>
             <a:r>
               <a:rPr lang="en-CA" dirty="0"/>
-              <a:t>Py -3.11 –m pip install </a:t>
+              <a:t>python -m pip install --upgrade pip </a:t>
+            </a:r>
+            <a:r>
+              <a:rPr lang="en-CA" dirty="0" err="1"/>
+              <a:t>setuptools</a:t>
+            </a:r>
+            <a:r>
+              <a:rPr lang="en-CA" dirty="0"/>
+              <a:t> wheel</a:t>
+            </a:r>
+          </a:p>
+        </p:txBody>
+      </p:sp>
+      <p:sp>
+        <p:nvSpPr>
+          <p:cNvPr id="7" name="TextBox 6">
+            <a:extLst>
+              <a:ext uri="{FF2B5EF4-FFF2-40B4-BE49-F238E27FC236}">
+                <a16:creationId xmlns:a16="http://schemas.microsoft.com/office/drawing/2014/main" id="{52E39250-2114-347E-90A9-A33451600EF4}"/>
+              </a:ext>
+            </a:extLst>
+          </p:cNvPr>
+          <p:cNvSpPr txBox="1"/>
+          <p:nvPr/>
+        </p:nvSpPr>
+        <p:spPr>
+          <a:xfrm>
+            <a:off x="1304716" y="2926326"/>
+            <a:ext cx="6096000" cy="369332"/>
+          </a:xfrm>
+          <a:prstGeom prst="rect">
+            <a:avLst/>
+          </a:prstGeom>
+          <a:noFill/>
+        </p:spPr>
+        <p:txBody>
+          <a:bodyPr wrap="square">
+            <a:spAutoFit/>
+          </a:bodyPr>
+          <a:lstStyle/>
+          <a:p>
+            <a:r>
+              <a:rPr lang="en-CA" dirty="0"/>
+              <a:t>python -m pip install </a:t>
             </a:r>
             <a:r>
               <a:rPr lang="en-CA" dirty="0" err="1"/>
               <a:t>pyinstaller</a:t>
             </a:r>
+            <a:endParaRPr lang="en-CA" dirty="0"/>
+          </a:p>
+        </p:txBody>
+      </p:sp>
+      <p:sp>
+        <p:nvSpPr>
+          <p:cNvPr id="9" name="TextBox 8">
+            <a:extLst>
+              <a:ext uri="{FF2B5EF4-FFF2-40B4-BE49-F238E27FC236}">
+                <a16:creationId xmlns:a16="http://schemas.microsoft.com/office/drawing/2014/main" id="{886EFF9A-A93B-8154-8B84-BA5847F3A85A}"/>
+              </a:ext>
+            </a:extLst>
+          </p:cNvPr>
+          <p:cNvSpPr txBox="1"/>
+          <p:nvPr/>
+        </p:nvSpPr>
+        <p:spPr>
+          <a:xfrm>
+            <a:off x="1386348" y="873236"/>
+            <a:ext cx="6096000" cy="923330"/>
+          </a:xfrm>
+          <a:prstGeom prst="rect">
+            <a:avLst/>
+          </a:prstGeom>
+          <a:noFill/>
+        </p:spPr>
+        <p:txBody>
+          <a:bodyPr wrap="square">
+            <a:spAutoFit/>
+          </a:bodyPr>
+          <a:lstStyle/>
+          <a:p>
             <a:r>
               <a:rPr lang="en-CA" dirty="0"/>
-              <a:t> (use 3.11)</a:t>
-            </a:r>
-          </a:p>
-          <a:p>
+              <a:t>python -m </a:t>
+            </a:r>
+            <a:r>
+              <a:rPr lang="en-CA" dirty="0" err="1"/>
+              <a:t>venv</a:t>
+            </a:r>
+            <a:r>
+              <a:rPr lang="en-CA" dirty="0"/>
+              <a:t> .</a:t>
+            </a:r>
+            <a:r>
+              <a:rPr lang="en-CA" dirty="0" err="1"/>
+              <a:t>venv</a:t>
+            </a:r>
             <a:endParaRPr lang="en-CA" dirty="0"/>
           </a:p>
           <a:p>
+            <a:endParaRPr lang="en-CA" dirty="0"/>
+          </a:p>
+          <a:p>
             <a:r>
               <a:rPr lang="en-CA" dirty="0"/>
-              <a:t>Then add </a:t>
-            </a:r>
-            <a:r>
-              <a:rPr lang="en-US" dirty="0"/>
-              <a:t>C:\Users\arson\AppData\Local\Programs\Python\Python311\Scripts to </a:t>
-            </a:r>
-            <a:r>
-              <a:rPr lang="en-US" dirty="0" err="1"/>
-              <a:t>PaTH</a:t>
+              <a:t>.</a:t>
+            </a:r>
+            <a:r>
+              <a:rPr lang="en-CA" dirty="0" err="1"/>
+              <a:t>venv</a:t>
+            </a:r>
+            <a:r>
+              <a:rPr lang="en-CA" dirty="0"/>
+              <a:t>\Scripts\activate.bat</a:t>
+            </a:r>
+          </a:p>
+        </p:txBody>
+      </p:sp>
+      <p:sp>
+        <p:nvSpPr>
+          <p:cNvPr id="11" name="TextBox 10">
+            <a:extLst>
+              <a:ext uri="{FF2B5EF4-FFF2-40B4-BE49-F238E27FC236}">
+                <a16:creationId xmlns:a16="http://schemas.microsoft.com/office/drawing/2014/main" id="{CF058655-01CE-0022-525E-CF6E23FDB439}"/>
+              </a:ext>
+            </a:extLst>
+          </p:cNvPr>
+          <p:cNvSpPr txBox="1"/>
+          <p:nvPr/>
+        </p:nvSpPr>
+        <p:spPr>
+          <a:xfrm>
+            <a:off x="1514167" y="4541274"/>
+            <a:ext cx="6096000" cy="369332"/>
+          </a:xfrm>
+          <a:prstGeom prst="rect">
+            <a:avLst/>
+          </a:prstGeom>
+          <a:noFill/>
+        </p:spPr>
+        <p:txBody>
+          <a:bodyPr wrap="square">
+            <a:spAutoFit/>
+          </a:bodyPr>
+          <a:lstStyle/>
+          <a:p>
+            <a:r>
+              <a:rPr lang="en-CA" dirty="0"/>
+              <a:t>python -m </a:t>
+            </a:r>
+            <a:r>
+              <a:rPr lang="en-CA" dirty="0" err="1"/>
+              <a:t>PyInstaller</a:t>
+            </a:r>
+            <a:r>
+              <a:rPr lang="en-CA" dirty="0"/>
+              <a:t> </a:t>
+            </a:r>
+            <a:r>
+              <a:rPr lang="en-CA" dirty="0" err="1"/>
+              <a:t>tcp_server.spec</a:t>
+            </a:r>
+            <a:r>
+              <a:rPr lang="en-CA" dirty="0"/>
+              <a:t> --clean</a:t>
+            </a:r>
+          </a:p>
+        </p:txBody>
+      </p:sp>
+      <p:sp>
+        <p:nvSpPr>
+          <p:cNvPr id="12" name="TextBox 11">
+            <a:extLst>
+              <a:ext uri="{FF2B5EF4-FFF2-40B4-BE49-F238E27FC236}">
+                <a16:creationId xmlns:a16="http://schemas.microsoft.com/office/drawing/2014/main" id="{F8BDF3A4-72F4-759A-E64C-59B14707586C}"/>
+              </a:ext>
+            </a:extLst>
+          </p:cNvPr>
+          <p:cNvSpPr txBox="1"/>
+          <p:nvPr/>
+        </p:nvSpPr>
+        <p:spPr>
+          <a:xfrm>
+            <a:off x="1304716" y="168977"/>
+            <a:ext cx="6096000" cy="646331"/>
+          </a:xfrm>
+          <a:prstGeom prst="rect">
+            <a:avLst/>
+          </a:prstGeom>
+          <a:noFill/>
+        </p:spPr>
+        <p:txBody>
+          <a:bodyPr wrap="square">
+            <a:spAutoFit/>
+          </a:bodyPr>
+          <a:lstStyle/>
+          <a:p>
+            <a:r>
+              <a:rPr lang="en-CA" dirty="0"/>
+              <a:t>You can use 3.11 or 3.12.x x &gt; 0, but just don’t use 3.12.0 because it has a bug with </a:t>
+            </a:r>
+            <a:r>
+              <a:rPr lang="en-CA" dirty="0" err="1"/>
+              <a:t>pyinstaller</a:t>
             </a:r>
             <a:endParaRPr lang="en-CA" dirty="0"/>
           </a:p>

</xml_diff>

<commit_message>
changed spec file to console=False
</commit_message>
<xml_diff>
--- a/2026-01-21 pyinstaller.pptx
+++ b/2026-01-21 pyinstaller.pptx
@@ -261,7 +261,7 @@
           <a:p>
             <a:fld id="{70F37DF9-BC8A-462E-82CA-A3E9A1A6EBC4}" type="datetimeFigureOut">
               <a:rPr lang="en-CA" smtClean="0"/>
-              <a:t>2026-01-21</a:t>
+              <a:t>2026-01-25</a:t>
             </a:fld>
             <a:endParaRPr lang="en-CA"/>
           </a:p>
@@ -461,7 +461,7 @@
           <a:p>
             <a:fld id="{70F37DF9-BC8A-462E-82CA-A3E9A1A6EBC4}" type="datetimeFigureOut">
               <a:rPr lang="en-CA" smtClean="0"/>
-              <a:t>2026-01-21</a:t>
+              <a:t>2026-01-25</a:t>
             </a:fld>
             <a:endParaRPr lang="en-CA"/>
           </a:p>
@@ -671,7 +671,7 @@
           <a:p>
             <a:fld id="{70F37DF9-BC8A-462E-82CA-A3E9A1A6EBC4}" type="datetimeFigureOut">
               <a:rPr lang="en-CA" smtClean="0"/>
-              <a:t>2026-01-21</a:t>
+              <a:t>2026-01-25</a:t>
             </a:fld>
             <a:endParaRPr lang="en-CA"/>
           </a:p>
@@ -871,7 +871,7 @@
           <a:p>
             <a:fld id="{70F37DF9-BC8A-462E-82CA-A3E9A1A6EBC4}" type="datetimeFigureOut">
               <a:rPr lang="en-CA" smtClean="0"/>
-              <a:t>2026-01-21</a:t>
+              <a:t>2026-01-25</a:t>
             </a:fld>
             <a:endParaRPr lang="en-CA"/>
           </a:p>
@@ -1147,7 +1147,7 @@
           <a:p>
             <a:fld id="{70F37DF9-BC8A-462E-82CA-A3E9A1A6EBC4}" type="datetimeFigureOut">
               <a:rPr lang="en-CA" smtClean="0"/>
-              <a:t>2026-01-21</a:t>
+              <a:t>2026-01-25</a:t>
             </a:fld>
             <a:endParaRPr lang="en-CA"/>
           </a:p>
@@ -1415,7 +1415,7 @@
           <a:p>
             <a:fld id="{70F37DF9-BC8A-462E-82CA-A3E9A1A6EBC4}" type="datetimeFigureOut">
               <a:rPr lang="en-CA" smtClean="0"/>
-              <a:t>2026-01-21</a:t>
+              <a:t>2026-01-25</a:t>
             </a:fld>
             <a:endParaRPr lang="en-CA"/>
           </a:p>
@@ -1830,7 +1830,7 @@
           <a:p>
             <a:fld id="{70F37DF9-BC8A-462E-82CA-A3E9A1A6EBC4}" type="datetimeFigureOut">
               <a:rPr lang="en-CA" smtClean="0"/>
-              <a:t>2026-01-21</a:t>
+              <a:t>2026-01-25</a:t>
             </a:fld>
             <a:endParaRPr lang="en-CA"/>
           </a:p>
@@ -1972,7 +1972,7 @@
           <a:p>
             <a:fld id="{70F37DF9-BC8A-462E-82CA-A3E9A1A6EBC4}" type="datetimeFigureOut">
               <a:rPr lang="en-CA" smtClean="0"/>
-              <a:t>2026-01-21</a:t>
+              <a:t>2026-01-25</a:t>
             </a:fld>
             <a:endParaRPr lang="en-CA"/>
           </a:p>
@@ -2085,7 +2085,7 @@
           <a:p>
             <a:fld id="{70F37DF9-BC8A-462E-82CA-A3E9A1A6EBC4}" type="datetimeFigureOut">
               <a:rPr lang="en-CA" smtClean="0"/>
-              <a:t>2026-01-21</a:t>
+              <a:t>2026-01-25</a:t>
             </a:fld>
             <a:endParaRPr lang="en-CA"/>
           </a:p>
@@ -2398,7 +2398,7 @@
           <a:p>
             <a:fld id="{70F37DF9-BC8A-462E-82CA-A3E9A1A6EBC4}" type="datetimeFigureOut">
               <a:rPr lang="en-CA" smtClean="0"/>
-              <a:t>2026-01-21</a:t>
+              <a:t>2026-01-25</a:t>
             </a:fld>
             <a:endParaRPr lang="en-CA"/>
           </a:p>
@@ -2687,7 +2687,7 @@
           <a:p>
             <a:fld id="{70F37DF9-BC8A-462E-82CA-A3E9A1A6EBC4}" type="datetimeFigureOut">
               <a:rPr lang="en-CA" smtClean="0"/>
-              <a:t>2026-01-21</a:t>
+              <a:t>2026-01-25</a:t>
             </a:fld>
             <a:endParaRPr lang="en-CA"/>
           </a:p>
@@ -2930,7 +2930,7 @@
           <a:p>
             <a:fld id="{70F37DF9-BC8A-462E-82CA-A3E9A1A6EBC4}" type="datetimeFigureOut">
               <a:rPr lang="en-CA" smtClean="0"/>
-              <a:t>2026-01-21</a:t>
+              <a:t>2026-01-25</a:t>
             </a:fld>
             <a:endParaRPr lang="en-CA"/>
           </a:p>
@@ -3557,7 +3557,7 @@
         </p:nvSpPr>
         <p:spPr>
           <a:xfrm>
-            <a:off x="1514167" y="4541274"/>
+            <a:off x="1484670" y="4541274"/>
             <a:ext cx="6096000" cy="369332"/>
           </a:xfrm>
           <a:prstGeom prst="rect">

</xml_diff>